<commit_message>
Analysis code updated for paper
</commit_message>
<xml_diff>
--- a/suli-poster.pptx
+++ b/suli-poster.pptx
@@ -1435,14 +1435,14 @@
           </a:ln>
           <a:extLst>
             <a:ext uri="{909E8E84-426E-40dd-AFC4-6F175D3DCCD1}">
-              <a14:hiddenFill xmlns="" xmlns:a14="http://schemas.microsoft.com/office/drawing/2010/main">
+              <a14:hiddenFill xmlns:a14="http://schemas.microsoft.com/office/drawing/2010/main" xmlns="">
                 <a:solidFill>
                   <a:srgbClr val="FFFFFF"/>
                 </a:solidFill>
               </a14:hiddenFill>
             </a:ext>
             <a:ext uri="{91240B29-F687-4f45-9708-019B960494DF}">
-              <a14:hiddenLine xmlns="" xmlns:a14="http://schemas.microsoft.com/office/drawing/2010/main" w="9525">
+              <a14:hiddenLine xmlns:a14="http://schemas.microsoft.com/office/drawing/2010/main" xmlns="" w="9525">
                 <a:solidFill>
                   <a:srgbClr val="000000"/>
                 </a:solidFill>
@@ -1810,7 +1810,7 @@
         </p:blipFill>
         <p:spPr>
           <a:xfrm>
-            <a:off x="3679715" y="37707015"/>
+            <a:off x="3591261" y="37944877"/>
             <a:ext cx="2042361" cy="1593713"/>
           </a:xfrm>
         </p:spPr>
@@ -1830,6 +1830,7 @@
           <a:bodyPr/>
           <a:lstStyle/>
           <a:p>
+            <a:pPr algn="ctr"/>
             <a:r>
               <a:rPr lang="en-US" dirty="0">
                 <a:latin typeface="+mj-lt"/>
@@ -1850,6 +1851,7 @@
             </a:r>
           </a:p>
           <a:p>
+            <a:pPr algn="ctr"/>
             <a:r>
               <a:rPr lang="en-US" sz="6600" b="0" dirty="0">
                 <a:latin typeface="+mj-lt"/>
@@ -1880,7 +1882,7 @@
         </p:nvSpPr>
         <p:spPr>
           <a:xfrm>
-            <a:off x="927424" y="7876589"/>
+            <a:off x="882892" y="7970789"/>
             <a:ext cx="13761720" cy="1229584"/>
           </a:xfrm>
         </p:spPr>
@@ -1888,6 +1890,7 @@
           <a:bodyPr/>
           <a:lstStyle/>
           <a:p>
+            <a:pPr algn="ctr"/>
             <a:r>
               <a:rPr lang="en-US" sz="5500" dirty="0">
                 <a:latin typeface="+mj-lt"/>
@@ -1917,7 +1920,10 @@
           <a:bodyPr/>
           <a:lstStyle/>
           <a:p>
-            <a:pPr lvl="0"/>
+            <a:pPr marL="571500" lvl="0" indent="-571500">
+              <a:buFont typeface="Arial" panose="020B0604020202020204" pitchFamily="34" charset="0"/>
+              <a:buChar char="•"/>
+            </a:pPr>
             <a:r>
               <a:rPr lang="en-US" sz="4400" dirty="0">
                 <a:solidFill>
@@ -1926,19 +1932,19 @@
                 <a:latin typeface="+mj-lt"/>
                 <a:cs typeface="Helvetica"/>
               </a:rPr>
-              <a:t>The axion is a hypothetical particle proposed by Frank </a:t>
-            </a:r>
-            <a:r>
-              <a:rPr lang="en-US" sz="4400" dirty="0" err="1">
+              <a:t>The axion is a hypothetical particle first proposed in the 1970s to resolve the strong CP problem</a:t>
+            </a:r>
+            <a:r>
+              <a:rPr lang="en-US" sz="4800" baseline="30000" dirty="0">
                 <a:solidFill>
                   <a:srgbClr val="000000"/>
                 </a:solidFill>
                 <a:latin typeface="+mj-lt"/>
                 <a:cs typeface="Helvetica"/>
               </a:rPr>
-              <a:t>Wilczek</a:t>
-            </a:r>
-            <a:r>
+              <a:t>1</a:t>
+            </a:r>
+            <a:br>
               <a:rPr lang="en-US" sz="4400" dirty="0">
                 <a:solidFill>
                   <a:srgbClr val="000000"/>
@@ -1946,38 +1952,7 @@
                 <a:latin typeface="+mj-lt"/>
                 <a:cs typeface="Helvetica"/>
               </a:rPr>
-              <a:t> and Steven Weinberg as a consequence of the Peccei-Quinn mechanism, which can explain why the strong interaction simultaneously preserves charge and parity symmetry.</a:t>
-            </a:r>
-            <a:r>
-              <a:rPr lang="en-US" sz="4400" baseline="30000" dirty="0">
-                <a:solidFill>
-                  <a:srgbClr val="000000"/>
-                </a:solidFill>
-                <a:latin typeface="+mj-lt"/>
-                <a:cs typeface="Helvetica"/>
-              </a:rPr>
-              <a:t>1</a:t>
-            </a:r>
-            <a:r>
-              <a:rPr lang="en-US" sz="4400" dirty="0">
-                <a:solidFill>
-                  <a:srgbClr val="000000"/>
-                </a:solidFill>
-                <a:latin typeface="+mj-lt"/>
-                <a:cs typeface="Helvetica"/>
-              </a:rPr>
-              <a:t> Due to their properties, axion-like particles make promising dark matter candidates. Under some theoretical models, axion-like particles can convert directly to photons in the presence of a magnetic field.</a:t>
-            </a:r>
-            <a:r>
-              <a:rPr lang="en-US" sz="4400" baseline="30000" dirty="0">
-                <a:solidFill>
-                  <a:srgbClr val="000000"/>
-                </a:solidFill>
-                <a:latin typeface="+mj-lt"/>
-                <a:cs typeface="Helvetica"/>
-              </a:rPr>
-              <a:t>2</a:t>
-            </a:r>
+            </a:br>
             <a:endParaRPr lang="en-US" sz="4400" dirty="0">
               <a:solidFill>
                 <a:srgbClr val="000000"/>
@@ -1987,7 +1962,39 @@
             </a:endParaRPr>
           </a:p>
           <a:p>
-            <a:pPr lvl="0"/>
+            <a:pPr marL="571500" lvl="0" indent="-571500">
+              <a:buFont typeface="Arial" panose="020B0604020202020204" pitchFamily="34" charset="0"/>
+              <a:buChar char="•"/>
+            </a:pPr>
+            <a:r>
+              <a:rPr lang="en-US" sz="4400" dirty="0">
+                <a:solidFill>
+                  <a:srgbClr val="000000"/>
+                </a:solidFill>
+                <a:latin typeface="+mj-lt"/>
+                <a:cs typeface="Helvetica"/>
+              </a:rPr>
+              <a:t>Due to their properties, axion-like particles are a well-motivated dark matter candidate</a:t>
+            </a:r>
+            <a:r>
+              <a:rPr lang="en-US" sz="4400" baseline="30000" dirty="0">
+                <a:solidFill>
+                  <a:srgbClr val="000000"/>
+                </a:solidFill>
+                <a:latin typeface="+mj-lt"/>
+                <a:cs typeface="Helvetica"/>
+              </a:rPr>
+              <a:t>5</a:t>
+            </a:r>
+            <a:br>
+              <a:rPr lang="en-US" sz="4400" dirty="0">
+                <a:solidFill>
+                  <a:srgbClr val="000000"/>
+                </a:solidFill>
+                <a:latin typeface="+mj-lt"/>
+                <a:cs typeface="Helvetica"/>
+              </a:rPr>
+            </a:br>
             <a:endParaRPr lang="en-US" sz="4400" dirty="0">
               <a:solidFill>
                 <a:srgbClr val="000000"/>
@@ -1997,7 +2004,10 @@
             </a:endParaRPr>
           </a:p>
           <a:p>
-            <a:pPr lvl="0"/>
+            <a:pPr marL="571500" lvl="0" indent="-571500">
+              <a:buFont typeface="Arial" panose="020B0604020202020204" pitchFamily="34" charset="0"/>
+              <a:buChar char="•"/>
+            </a:pPr>
             <a:r>
               <a:rPr lang="en-US" sz="4400" dirty="0">
                 <a:solidFill>
@@ -2006,7 +2016,7 @@
                 <a:latin typeface="+mj-lt"/>
                 <a:cs typeface="Helvetica"/>
               </a:rPr>
-              <a:t>The Broadband Reflector Experiment for Axion Detection (BREAD) searches for this axion-to-photon conversion.</a:t>
+              <a:t>The Broadband Reflector Experiment for Axion Detection (BREAD) searches for axion-to-photon conversion in a magnetic field</a:t>
             </a:r>
             <a:r>
               <a:rPr lang="en-US" sz="4800" baseline="30000" dirty="0">
@@ -2016,7 +2026,7 @@
                 <a:latin typeface="+mj-lt"/>
                 <a:cs typeface="Helvetica"/>
               </a:rPr>
-              <a:t>3</a:t>
+              <a:t>6</a:t>
             </a:r>
             <a:r>
               <a:rPr lang="en-US" sz="4400" dirty="0">
@@ -2026,18 +2036,30 @@
                 <a:latin typeface="+mj-lt"/>
                 <a:cs typeface="Helvetica"/>
               </a:rPr>
-              <a:t> These converted photons are emitted normal to the inner cylindrical surface, reflected off of the parabolic reflector, reflected again off of the inner cylindrical surface, and focused to a single point. </a:t>
-            </a:r>
-            <a:r>
-              <a:rPr lang="en-US" sz="4400" dirty="0" err="1">
+              <a:t> </a:t>
+            </a:r>
+            <a:br>
+              <a:rPr lang="en-US" sz="4400" dirty="0">
                 <a:solidFill>
                   <a:srgbClr val="000000"/>
                 </a:solidFill>
                 <a:latin typeface="+mj-lt"/>
                 <a:cs typeface="Helvetica"/>
               </a:rPr>
-              <a:t>InfraBREAD</a:t>
-            </a:r>
+            </a:br>
+            <a:endParaRPr lang="en-US" sz="4400" dirty="0">
+              <a:solidFill>
+                <a:srgbClr val="000000"/>
+              </a:solidFill>
+              <a:latin typeface="+mj-lt"/>
+              <a:cs typeface="Helvetica"/>
+            </a:endParaRPr>
+          </a:p>
+          <a:p>
+            <a:pPr marL="571500" lvl="0" indent="-571500">
+              <a:buFont typeface="Arial" panose="020B0604020202020204" pitchFamily="34" charset="0"/>
+              <a:buChar char="•"/>
+            </a:pPr>
             <a:r>
               <a:rPr lang="en-US" sz="4400" dirty="0">
                 <a:solidFill>
@@ -2046,7 +2068,7 @@
                 <a:latin typeface="+mj-lt"/>
                 <a:cs typeface="Helvetica"/>
               </a:rPr>
-              <a:t> specifically detects converted infrared photons using a superconducting nanowire single-photon detector (SNSPD).</a:t>
+              <a:t>These converted photons are reflected, focused, and detected by a superconducting nanowire single photon detector (SNSPD)</a:t>
             </a:r>
           </a:p>
           <a:p>
@@ -2124,13 +2146,15 @@
       <p:cxnSp>
         <p:nvCxnSpPr>
           <p:cNvPr id="59" name="Straight Connector 58"/>
-          <p:cNvCxnSpPr/>
+          <p:cNvCxnSpPr>
+            <a:cxnSpLocks/>
+          </p:cNvCxnSpPr>
           <p:nvPr/>
         </p:nvCxnSpPr>
         <p:spPr>
           <a:xfrm>
-            <a:off x="933476" y="37167587"/>
-            <a:ext cx="13755668" cy="0"/>
+            <a:off x="933476" y="37897091"/>
+            <a:ext cx="28454072" cy="0"/>
           </a:xfrm>
           <a:prstGeom prst="line">
             <a:avLst/>
@@ -2169,7 +2193,7 @@
         </p:nvSpPr>
         <p:spPr>
           <a:xfrm>
-            <a:off x="15550004" y="34115027"/>
+            <a:off x="15550004" y="34861787"/>
             <a:ext cx="13761720" cy="1229584"/>
           </a:xfrm>
         </p:spPr>
@@ -2177,6 +2201,7 @@
           <a:bodyPr/>
           <a:lstStyle/>
           <a:p>
+            <a:pPr algn="ctr"/>
             <a:r>
               <a:rPr lang="en-US" dirty="0">
                 <a:latin typeface="+mj-lt"/>
@@ -2241,7 +2266,7 @@
         </p:nvSpPr>
         <p:spPr>
           <a:xfrm>
-            <a:off x="1035291" y="27489739"/>
+            <a:off x="634761" y="24506888"/>
             <a:ext cx="13761720" cy="1229584"/>
           </a:xfrm>
           <a:prstGeom prst="rect">
@@ -2388,7 +2413,7 @@
             </a:lvl9pPr>
           </a:lstStyle>
           <a:p>
-            <a:pPr fontAlgn="auto">
+            <a:pPr algn="ctr" fontAlgn="auto">
               <a:spcAft>
                 <a:spcPts val="0"/>
               </a:spcAft>
@@ -2420,7 +2445,7 @@
         </p:nvSpPr>
         <p:spPr>
           <a:xfrm>
-            <a:off x="15449977" y="37553339"/>
+            <a:off x="15449977" y="37787799"/>
             <a:ext cx="13761720" cy="1593712"/>
           </a:xfrm>
         </p:spPr>
@@ -2477,8 +2502,8 @@
         </p:blipFill>
         <p:spPr>
           <a:xfrm>
-            <a:off x="1148864" y="21346596"/>
-            <a:ext cx="3623428" cy="5381406"/>
+            <a:off x="1620111" y="19064921"/>
+            <a:ext cx="3201288" cy="4754457"/>
           </a:xfrm>
         </p:spPr>
       </p:pic>
@@ -2496,8 +2521,8 @@
         </p:nvSpPr>
         <p:spPr>
           <a:xfrm>
-            <a:off x="5722076" y="21397119"/>
-            <a:ext cx="7803407" cy="3539430"/>
+            <a:off x="5853569" y="20315252"/>
+            <a:ext cx="7803407" cy="2062103"/>
           </a:xfrm>
           <a:prstGeom prst="rect">
             <a:avLst/>
@@ -2511,49 +2536,16 @@
           <a:lstStyle/>
           <a:p>
             <a:r>
-              <a:rPr lang="en-US" sz="3200" b="1">
+              <a:rPr lang="en-US" sz="3200" b="1" dirty="0">
                 <a:solidFill>
                   <a:schemeClr val="accent1"/>
                 </a:solidFill>
               </a:rPr>
-              <a:t>A cutaway view of the BREAD reflector, which is a parabolic reflector cut in half about its central axis and revolved around another, perpendicular axis. Any photon emitted normal to the inner cylindrical surface gets focused to a singular point after two reflections.</a:t>
-            </a:r>
-            <a:endParaRPr lang="en-US" sz="3200" b="1" dirty="0">
-              <a:solidFill>
-                <a:schemeClr val="accent1"/>
-              </a:solidFill>
-            </a:endParaRPr>
+              <a:t>A cutaway view of the BREAD reflector. Any photon emitted normal to the inner cylindrical surface gets focused to a singular point after two reflections.</a:t>
+            </a:r>
           </a:p>
         </p:txBody>
       </p:sp>
-      <p:pic>
-        <p:nvPicPr>
-          <p:cNvPr id="4" name="Picture Placeholder 3" descr="A diagram of a cylindrical object with text&#10;&#10;Description automatically generated">
-            <a:extLst>
-              <a:ext uri="{FF2B5EF4-FFF2-40B4-BE49-F238E27FC236}">
-                <a16:creationId xmlns:a16="http://schemas.microsoft.com/office/drawing/2014/main" id="{580BB12F-004E-49F4-B0EE-7CB96469C65A}"/>
-              </a:ext>
-            </a:extLst>
-          </p:cNvPr>
-          <p:cNvPicPr>
-            <a:picLocks noGrp="1" noChangeAspect="1"/>
-          </p:cNvPicPr>
-          <p:nvPr>
-            <p:ph type="pic" sz="quarter" idx="22"/>
-          </p:nvPr>
-        </p:nvPicPr>
-        <p:blipFill rotWithShape="1">
-          <a:blip r:embed="rId5"/>
-          <a:srcRect t="-520" b="-148"/>
-          <a:stretch/>
-        </p:blipFill>
-        <p:spPr>
-          <a:xfrm>
-            <a:off x="955551" y="29060554"/>
-            <a:ext cx="6985473" cy="6852188"/>
-          </a:xfrm>
-        </p:spPr>
-      </p:pic>
       <p:pic>
         <p:nvPicPr>
           <p:cNvPr id="11" name="Picture 10" descr="A blue and white logo&#10;&#10;Description automatically generated">
@@ -2569,15 +2561,15 @@
           <p:nvPr/>
         </p:nvPicPr>
         <p:blipFill>
-          <a:blip r:embed="rId6"/>
+          <a:blip r:embed="rId5"/>
           <a:stretch>
             <a:fillRect/>
           </a:stretch>
         </p:blipFill>
         <p:spPr>
           <a:xfrm>
-            <a:off x="1055578" y="37551372"/>
-            <a:ext cx="1905000" cy="1905000"/>
+            <a:off x="1454864" y="37944877"/>
+            <a:ext cx="1537151" cy="1537151"/>
           </a:xfrm>
           <a:prstGeom prst="rect">
             <a:avLst/>
@@ -2598,8 +2590,8 @@
         </p:nvSpPr>
         <p:spPr>
           <a:xfrm>
-            <a:off x="7941024" y="28944108"/>
-            <a:ext cx="6501807" cy="7478970"/>
+            <a:off x="1385414" y="35185347"/>
+            <a:ext cx="13179901" cy="2554545"/>
           </a:xfrm>
           <a:prstGeom prst="rect">
             <a:avLst/>
@@ -2618,7 +2610,7 @@
                   <a:schemeClr val="accent1"/>
                 </a:solidFill>
               </a:rPr>
-              <a:t>Due to uneven thermal contraction when the detector is cooled to ~0.1K, the true focal spot of the detector may move slightly. </a:t>
+              <a:t>Left: Due to uneven thermal contraction when the detector is cooled to ~0.1K, the true focal spot of the detector may move slightly. </a:t>
             </a:r>
           </a:p>
           <a:p>
@@ -2635,24 +2627,7 @@
                   <a:schemeClr val="accent1"/>
                 </a:solidFill>
               </a:rPr>
-              <a:t>A “hot” absorber (~10 K) emits blackbody radiation into the reflector cavity. The SNSPD sits beneath a mount, which blocks blackbody radiation from above from passing through it. </a:t>
-            </a:r>
-          </a:p>
-          <a:p>
-            <a:endParaRPr lang="en-US" sz="3200" b="1" dirty="0">
-              <a:solidFill>
-                <a:schemeClr val="accent1"/>
-              </a:solidFill>
-            </a:endParaRPr>
-          </a:p>
-          <a:p>
-            <a:r>
-              <a:rPr lang="en-US" sz="3200" b="1" dirty="0">
-                <a:solidFill>
-                  <a:schemeClr val="accent1"/>
-                </a:solidFill>
-              </a:rPr>
-              <a:t>Our initial expectation is that the focus should be exactly at location of minimum blackbody photon counts.</a:t>
+              <a:t>Right: Example 2D plots of the number of rays recorded by the SNSPD at two different detector positions.</a:t>
             </a:r>
           </a:p>
         </p:txBody>
@@ -2673,7 +2648,7 @@
         </p:nvSpPr>
         <p:spPr>
           <a:xfrm>
-            <a:off x="15614104" y="7858109"/>
+            <a:off x="15622664" y="7970789"/>
             <a:ext cx="13761720" cy="1229584"/>
           </a:xfrm>
           <a:prstGeom prst="rect">
@@ -2820,7 +2795,7 @@
             </a:lvl9pPr>
           </a:lstStyle>
           <a:p>
-            <a:pPr fontAlgn="auto">
+            <a:pPr algn="ctr" fontAlgn="auto">
               <a:spcAft>
                 <a:spcPts val="0"/>
               </a:spcAft>
@@ -2829,462 +2804,11 @@
               <a:rPr lang="en-US" sz="5500" dirty="0">
                 <a:latin typeface="+mj-lt"/>
               </a:rPr>
-              <a:t>Varying the Size of the Source and Block</a:t>
+              <a:t>Varying the Size of the Absorber and Mount</a:t>
             </a:r>
           </a:p>
         </p:txBody>
       </p:sp>
-      <p:grpSp>
-        <p:nvGrpSpPr>
-          <p:cNvPr id="30" name="Group 29">
-            <a:extLst>
-              <a:ext uri="{FF2B5EF4-FFF2-40B4-BE49-F238E27FC236}">
-                <a16:creationId xmlns:a16="http://schemas.microsoft.com/office/drawing/2014/main" id="{E445873C-82D2-ABFD-FEAF-3E9EB6B6C6FC}"/>
-              </a:ext>
-            </a:extLst>
-          </p:cNvPr>
-          <p:cNvGrpSpPr/>
-          <p:nvPr/>
-        </p:nvGrpSpPr>
-        <p:grpSpPr>
-          <a:xfrm>
-            <a:off x="16020206" y="9301931"/>
-            <a:ext cx="7082031" cy="5931619"/>
-            <a:chOff x="16338763" y="9308382"/>
-            <a:chExt cx="6156960" cy="4822296"/>
-          </a:xfrm>
-        </p:grpSpPr>
-        <p:pic>
-          <p:nvPicPr>
-            <p:cNvPr id="28" name="Picture 27" descr="A graph of a graph with numbers and colored dots&#10;&#10;Description automatically generated with medium confidence">
-              <a:extLst>
-                <a:ext uri="{FF2B5EF4-FFF2-40B4-BE49-F238E27FC236}">
-                  <a16:creationId xmlns:a16="http://schemas.microsoft.com/office/drawing/2014/main" id="{656B5671-18C4-97F2-FCED-EB2BE200B71C}"/>
-                </a:ext>
-              </a:extLst>
-            </p:cNvPr>
-            <p:cNvPicPr>
-              <a:picLocks noChangeAspect="1"/>
-            </p:cNvPicPr>
-            <p:nvPr/>
-          </p:nvPicPr>
-          <p:blipFill>
-            <a:blip r:embed="rId7"/>
-            <a:stretch>
-              <a:fillRect/>
-            </a:stretch>
-          </p:blipFill>
-          <p:spPr>
-            <a:xfrm>
-              <a:off x="16338763" y="9308382"/>
-              <a:ext cx="5852172" cy="4389129"/>
-            </a:xfrm>
-            <a:prstGeom prst="rect">
-              <a:avLst/>
-            </a:prstGeom>
-          </p:spPr>
-        </p:pic>
-        <p:sp>
-          <p:nvSpPr>
-            <p:cNvPr id="29" name="TextBox 28">
-              <a:extLst>
-                <a:ext uri="{FF2B5EF4-FFF2-40B4-BE49-F238E27FC236}">
-                  <a16:creationId xmlns:a16="http://schemas.microsoft.com/office/drawing/2014/main" id="{43F5DBD0-8E18-1205-584D-651777649664}"/>
-                </a:ext>
-              </a:extLst>
-            </p:cNvPr>
-            <p:cNvSpPr txBox="1"/>
-            <p:nvPr/>
-          </p:nvSpPr>
-          <p:spPr>
-            <a:xfrm>
-              <a:off x="16338763" y="13719696"/>
-              <a:ext cx="6156960" cy="410982"/>
-            </a:xfrm>
-            <a:prstGeom prst="rect">
-              <a:avLst/>
-            </a:prstGeom>
-            <a:noFill/>
-          </p:spPr>
-          <p:txBody>
-            <a:bodyPr wrap="square" rtlCol="0">
-              <a:spAutoFit/>
-            </a:bodyPr>
-            <a:lstStyle/>
-            <a:p>
-              <a:pPr algn="ctr"/>
-              <a:r>
-                <a:rPr lang="en-US" sz="2800" dirty="0">
-                  <a:solidFill>
-                    <a:schemeClr val="accent1"/>
-                  </a:solidFill>
-                </a:rPr>
-                <a:t>40 mm radius source, 20mm radius block</a:t>
-              </a:r>
-            </a:p>
-          </p:txBody>
-        </p:sp>
-      </p:grpSp>
-      <p:grpSp>
-        <p:nvGrpSpPr>
-          <p:cNvPr id="31" name="Group 30">
-            <a:extLst>
-              <a:ext uri="{FF2B5EF4-FFF2-40B4-BE49-F238E27FC236}">
-                <a16:creationId xmlns:a16="http://schemas.microsoft.com/office/drawing/2014/main" id="{2B061168-D926-889C-5902-8368FB0F8113}"/>
-              </a:ext>
-            </a:extLst>
-          </p:cNvPr>
-          <p:cNvGrpSpPr/>
-          <p:nvPr/>
-        </p:nvGrpSpPr>
-        <p:grpSpPr>
-          <a:xfrm>
-            <a:off x="23102236" y="9477039"/>
-            <a:ext cx="7082031" cy="5774204"/>
-            <a:chOff x="16338763" y="9450743"/>
-            <a:chExt cx="6156960" cy="4694321"/>
-          </a:xfrm>
-        </p:grpSpPr>
-        <p:pic>
-          <p:nvPicPr>
-            <p:cNvPr id="33" name="Picture 32">
-              <a:extLst>
-                <a:ext uri="{FF2B5EF4-FFF2-40B4-BE49-F238E27FC236}">
-                  <a16:creationId xmlns:a16="http://schemas.microsoft.com/office/drawing/2014/main" id="{053DE570-3AFE-FCCD-F04B-5BEA92185B31}"/>
-                </a:ext>
-              </a:extLst>
-            </p:cNvPr>
-            <p:cNvPicPr>
-              <a:picLocks noChangeAspect="1"/>
-            </p:cNvPicPr>
-            <p:nvPr/>
-          </p:nvPicPr>
-          <p:blipFill>
-            <a:blip r:embed="rId8"/>
-            <a:srcRect/>
-            <a:stretch/>
-          </p:blipFill>
-          <p:spPr>
-            <a:xfrm>
-              <a:off x="16338763" y="9450743"/>
-              <a:ext cx="5852172" cy="4104407"/>
-            </a:xfrm>
-            <a:prstGeom prst="rect">
-              <a:avLst/>
-            </a:prstGeom>
-          </p:spPr>
-        </p:pic>
-        <p:sp>
-          <p:nvSpPr>
-            <p:cNvPr id="34" name="TextBox 33">
-              <a:extLst>
-                <a:ext uri="{FF2B5EF4-FFF2-40B4-BE49-F238E27FC236}">
-                  <a16:creationId xmlns:a16="http://schemas.microsoft.com/office/drawing/2014/main" id="{EFF5E76F-4DE7-D1D4-69B0-17C4C3399D80}"/>
-                </a:ext>
-              </a:extLst>
-            </p:cNvPr>
-            <p:cNvSpPr txBox="1"/>
-            <p:nvPr/>
-          </p:nvSpPr>
-          <p:spPr>
-            <a:xfrm>
-              <a:off x="16338763" y="13719696"/>
-              <a:ext cx="6156960" cy="425368"/>
-            </a:xfrm>
-            <a:prstGeom prst="rect">
-              <a:avLst/>
-            </a:prstGeom>
-            <a:noFill/>
-          </p:spPr>
-          <p:txBody>
-            <a:bodyPr wrap="square" rtlCol="0">
-              <a:spAutoFit/>
-            </a:bodyPr>
-            <a:lstStyle/>
-            <a:p>
-              <a:pPr algn="ctr"/>
-              <a:r>
-                <a:rPr lang="en-US" sz="2800" dirty="0">
-                  <a:solidFill>
-                    <a:schemeClr val="accent1"/>
-                  </a:solidFill>
-                </a:rPr>
-                <a:t>40 mm radius source, 30mm radius block</a:t>
-              </a:r>
-            </a:p>
-          </p:txBody>
-        </p:sp>
-      </p:grpSp>
-      <p:grpSp>
-        <p:nvGrpSpPr>
-          <p:cNvPr id="35" name="Group 34">
-            <a:extLst>
-              <a:ext uri="{FF2B5EF4-FFF2-40B4-BE49-F238E27FC236}">
-                <a16:creationId xmlns:a16="http://schemas.microsoft.com/office/drawing/2014/main" id="{0B5FA5D4-7184-B6EE-4802-25DE16A80975}"/>
-              </a:ext>
-            </a:extLst>
-          </p:cNvPr>
-          <p:cNvGrpSpPr/>
-          <p:nvPr/>
-        </p:nvGrpSpPr>
-        <p:grpSpPr>
-          <a:xfrm>
-            <a:off x="16004966" y="15679719"/>
-            <a:ext cx="7082031" cy="5774204"/>
-            <a:chOff x="16338763" y="9450743"/>
-            <a:chExt cx="6156960" cy="4694321"/>
-          </a:xfrm>
-        </p:grpSpPr>
-        <p:pic>
-          <p:nvPicPr>
-            <p:cNvPr id="38" name="Picture 37">
-              <a:extLst>
-                <a:ext uri="{FF2B5EF4-FFF2-40B4-BE49-F238E27FC236}">
-                  <a16:creationId xmlns:a16="http://schemas.microsoft.com/office/drawing/2014/main" id="{88A154B9-243D-046D-E761-53B6FEA29A08}"/>
-                </a:ext>
-              </a:extLst>
-            </p:cNvPr>
-            <p:cNvPicPr>
-              <a:picLocks noChangeAspect="1"/>
-            </p:cNvPicPr>
-            <p:nvPr/>
-          </p:nvPicPr>
-          <p:blipFill>
-            <a:blip r:embed="rId9"/>
-            <a:srcRect/>
-            <a:stretch/>
-          </p:blipFill>
-          <p:spPr>
-            <a:xfrm>
-              <a:off x="16338763" y="9450743"/>
-              <a:ext cx="5852172" cy="4104407"/>
-            </a:xfrm>
-            <a:prstGeom prst="rect">
-              <a:avLst/>
-            </a:prstGeom>
-          </p:spPr>
-        </p:pic>
-        <p:sp>
-          <p:nvSpPr>
-            <p:cNvPr id="39" name="TextBox 38">
-              <a:extLst>
-                <a:ext uri="{FF2B5EF4-FFF2-40B4-BE49-F238E27FC236}">
-                  <a16:creationId xmlns:a16="http://schemas.microsoft.com/office/drawing/2014/main" id="{2E02069E-62D3-6D5F-4884-4761DCBFC161}"/>
-                </a:ext>
-              </a:extLst>
-            </p:cNvPr>
-            <p:cNvSpPr txBox="1"/>
-            <p:nvPr/>
-          </p:nvSpPr>
-          <p:spPr>
-            <a:xfrm>
-              <a:off x="16338763" y="13719696"/>
-              <a:ext cx="6156960" cy="425368"/>
-            </a:xfrm>
-            <a:prstGeom prst="rect">
-              <a:avLst/>
-            </a:prstGeom>
-            <a:noFill/>
-          </p:spPr>
-          <p:txBody>
-            <a:bodyPr wrap="square" rtlCol="0">
-              <a:spAutoFit/>
-            </a:bodyPr>
-            <a:lstStyle/>
-            <a:p>
-              <a:pPr algn="ctr"/>
-              <a:r>
-                <a:rPr lang="en-US" sz="2800" dirty="0">
-                  <a:solidFill>
-                    <a:schemeClr val="accent1"/>
-                  </a:solidFill>
-                </a:rPr>
-                <a:t>60 mm radius source, 20mm radius block</a:t>
-              </a:r>
-            </a:p>
-          </p:txBody>
-        </p:sp>
-      </p:grpSp>
-      <p:grpSp>
-        <p:nvGrpSpPr>
-          <p:cNvPr id="40" name="Group 39">
-            <a:extLst>
-              <a:ext uri="{FF2B5EF4-FFF2-40B4-BE49-F238E27FC236}">
-                <a16:creationId xmlns:a16="http://schemas.microsoft.com/office/drawing/2014/main" id="{B9DD16C8-9138-C17A-8163-10F21A32AC0A}"/>
-              </a:ext>
-            </a:extLst>
-          </p:cNvPr>
-          <p:cNvGrpSpPr/>
-          <p:nvPr/>
-        </p:nvGrpSpPr>
-        <p:grpSpPr>
-          <a:xfrm>
-            <a:off x="23102237" y="15679719"/>
-            <a:ext cx="7082031" cy="5774204"/>
-            <a:chOff x="16338763" y="9450743"/>
-            <a:chExt cx="6156960" cy="4694321"/>
-          </a:xfrm>
-        </p:grpSpPr>
-        <p:pic>
-          <p:nvPicPr>
-            <p:cNvPr id="41" name="Picture 40">
-              <a:extLst>
-                <a:ext uri="{FF2B5EF4-FFF2-40B4-BE49-F238E27FC236}">
-                  <a16:creationId xmlns:a16="http://schemas.microsoft.com/office/drawing/2014/main" id="{3CFEAFFE-02A0-4704-CE16-E617117200FC}"/>
-                </a:ext>
-              </a:extLst>
-            </p:cNvPr>
-            <p:cNvPicPr>
-              <a:picLocks noChangeAspect="1"/>
-            </p:cNvPicPr>
-            <p:nvPr/>
-          </p:nvPicPr>
-          <p:blipFill>
-            <a:blip r:embed="rId10"/>
-            <a:srcRect/>
-            <a:stretch/>
-          </p:blipFill>
-          <p:spPr>
-            <a:xfrm>
-              <a:off x="16338763" y="9450743"/>
-              <a:ext cx="5852171" cy="4104407"/>
-            </a:xfrm>
-            <a:prstGeom prst="rect">
-              <a:avLst/>
-            </a:prstGeom>
-          </p:spPr>
-        </p:pic>
-        <p:sp>
-          <p:nvSpPr>
-            <p:cNvPr id="42" name="TextBox 41">
-              <a:extLst>
-                <a:ext uri="{FF2B5EF4-FFF2-40B4-BE49-F238E27FC236}">
-                  <a16:creationId xmlns:a16="http://schemas.microsoft.com/office/drawing/2014/main" id="{E4EF013C-F2DE-3826-FAC5-C0E10D7953CC}"/>
-                </a:ext>
-              </a:extLst>
-            </p:cNvPr>
-            <p:cNvSpPr txBox="1"/>
-            <p:nvPr/>
-          </p:nvSpPr>
-          <p:spPr>
-            <a:xfrm>
-              <a:off x="16338763" y="13719696"/>
-              <a:ext cx="6156960" cy="425368"/>
-            </a:xfrm>
-            <a:prstGeom prst="rect">
-              <a:avLst/>
-            </a:prstGeom>
-            <a:noFill/>
-          </p:spPr>
-          <p:txBody>
-            <a:bodyPr wrap="square" rtlCol="0">
-              <a:spAutoFit/>
-            </a:bodyPr>
-            <a:lstStyle/>
-            <a:p>
-              <a:pPr algn="ctr"/>
-              <a:r>
-                <a:rPr lang="en-US" sz="2800" dirty="0">
-                  <a:solidFill>
-                    <a:schemeClr val="accent1"/>
-                  </a:solidFill>
-                </a:rPr>
-                <a:t>60 mm radius source, 30mm radius block</a:t>
-              </a:r>
-            </a:p>
-          </p:txBody>
-        </p:sp>
-      </p:grpSp>
-      <p:grpSp>
-        <p:nvGrpSpPr>
-          <p:cNvPr id="44" name="Group 43">
-            <a:extLst>
-              <a:ext uri="{FF2B5EF4-FFF2-40B4-BE49-F238E27FC236}">
-                <a16:creationId xmlns:a16="http://schemas.microsoft.com/office/drawing/2014/main" id="{873DBE75-A8B8-3A16-E97E-1E346123E4C2}"/>
-              </a:ext>
-            </a:extLst>
-          </p:cNvPr>
-          <p:cNvGrpSpPr/>
-          <p:nvPr/>
-        </p:nvGrpSpPr>
-        <p:grpSpPr>
-          <a:xfrm>
-            <a:off x="16020206" y="21705078"/>
-            <a:ext cx="7082031" cy="5774204"/>
-            <a:chOff x="16338763" y="9450743"/>
-            <a:chExt cx="6156960" cy="4694321"/>
-          </a:xfrm>
-        </p:grpSpPr>
-        <p:pic>
-          <p:nvPicPr>
-            <p:cNvPr id="45" name="Picture 44">
-              <a:extLst>
-                <a:ext uri="{FF2B5EF4-FFF2-40B4-BE49-F238E27FC236}">
-                  <a16:creationId xmlns:a16="http://schemas.microsoft.com/office/drawing/2014/main" id="{5EA9DAF8-35CE-309C-9480-E0D5429EABE6}"/>
-                </a:ext>
-              </a:extLst>
-            </p:cNvPr>
-            <p:cNvPicPr>
-              <a:picLocks noChangeAspect="1"/>
-            </p:cNvPicPr>
-            <p:nvPr/>
-          </p:nvPicPr>
-          <p:blipFill>
-            <a:blip r:embed="rId11"/>
-            <a:srcRect/>
-            <a:stretch/>
-          </p:blipFill>
-          <p:spPr>
-            <a:xfrm>
-              <a:off x="16338763" y="9450743"/>
-              <a:ext cx="5852171" cy="4104407"/>
-            </a:xfrm>
-            <a:prstGeom prst="rect">
-              <a:avLst/>
-            </a:prstGeom>
-          </p:spPr>
-        </p:pic>
-        <p:sp>
-          <p:nvSpPr>
-            <p:cNvPr id="46" name="TextBox 45">
-              <a:extLst>
-                <a:ext uri="{FF2B5EF4-FFF2-40B4-BE49-F238E27FC236}">
-                  <a16:creationId xmlns:a16="http://schemas.microsoft.com/office/drawing/2014/main" id="{D457A164-38FC-E360-C15C-D0221DBA2E57}"/>
-                </a:ext>
-              </a:extLst>
-            </p:cNvPr>
-            <p:cNvSpPr txBox="1"/>
-            <p:nvPr/>
-          </p:nvSpPr>
-          <p:spPr>
-            <a:xfrm>
-              <a:off x="16338763" y="13719696"/>
-              <a:ext cx="6156960" cy="425368"/>
-            </a:xfrm>
-            <a:prstGeom prst="rect">
-              <a:avLst/>
-            </a:prstGeom>
-            <a:noFill/>
-          </p:spPr>
-          <p:txBody>
-            <a:bodyPr wrap="square" rtlCol="0">
-              <a:spAutoFit/>
-            </a:bodyPr>
-            <a:lstStyle/>
-            <a:p>
-              <a:pPr algn="ctr"/>
-              <a:r>
-                <a:rPr lang="en-US" sz="2800" dirty="0">
-                  <a:solidFill>
-                    <a:schemeClr val="accent1"/>
-                  </a:solidFill>
-                </a:rPr>
-                <a:t>80 mm radius source, 14mm radius block</a:t>
-              </a:r>
-            </a:p>
-          </p:txBody>
-        </p:sp>
-      </p:grpSp>
       <p:sp>
         <p:nvSpPr>
           <p:cNvPr id="50" name="Text Placeholder 8">
@@ -3301,7 +2825,7 @@
         </p:nvSpPr>
         <p:spPr>
           <a:xfrm>
-            <a:off x="15614104" y="28104531"/>
+            <a:off x="15614104" y="17459961"/>
             <a:ext cx="13761720" cy="1229584"/>
           </a:xfrm>
           <a:prstGeom prst="rect">
@@ -3448,7 +2972,7 @@
             </a:lvl9pPr>
           </a:lstStyle>
           <a:p>
-            <a:pPr fontAlgn="auto">
+            <a:pPr algn="ctr" fontAlgn="auto">
               <a:spcAft>
                 <a:spcPts val="0"/>
               </a:spcAft>
@@ -3478,8 +3002,8 @@
         </p:nvSpPr>
         <p:spPr>
           <a:xfrm>
-            <a:off x="18535415" y="29252991"/>
-            <a:ext cx="3044925" cy="1229584"/>
+            <a:off x="16529538" y="18478309"/>
+            <a:ext cx="12942047" cy="1229584"/>
           </a:xfrm>
           <a:prstGeom prst="rect">
             <a:avLst/>
@@ -3625,7 +3149,7 @@
             </a:lvl9pPr>
           </a:lstStyle>
           <a:p>
-            <a:pPr fontAlgn="auto">
+            <a:pPr algn="ctr" fontAlgn="auto">
               <a:spcAft>
                 <a:spcPts val="0"/>
               </a:spcAft>
@@ -3634,72 +3158,7 @@
               <a:rPr lang="en-US" sz="3600" dirty="0">
                 <a:latin typeface="+mj-lt"/>
               </a:rPr>
-              <a:t>Prediction </a:t>
-            </a:r>
-          </a:p>
-        </p:txBody>
-      </p:sp>
-      <p:pic>
-        <p:nvPicPr>
-          <p:cNvPr id="55" name="Picture 54" descr="A white paper with writing on it&#10;&#10;Description automatically generated">
-            <a:extLst>
-              <a:ext uri="{FF2B5EF4-FFF2-40B4-BE49-F238E27FC236}">
-                <a16:creationId xmlns:a16="http://schemas.microsoft.com/office/drawing/2014/main" id="{6BE7B776-8E50-EFFD-A8C6-F040BBB3836E}"/>
-              </a:ext>
-            </a:extLst>
-          </p:cNvPr>
-          <p:cNvPicPr>
-            <a:picLocks noChangeAspect="1"/>
-          </p:cNvPicPr>
-          <p:nvPr/>
-        </p:nvPicPr>
-        <p:blipFill>
-          <a:blip r:embed="rId12"/>
-          <a:stretch>
-            <a:fillRect/>
-          </a:stretch>
-        </p:blipFill>
-        <p:spPr>
-          <a:xfrm>
-            <a:off x="16516930" y="30444107"/>
-            <a:ext cx="6678737" cy="2073853"/>
-          </a:xfrm>
-          <a:prstGeom prst="rect">
-            <a:avLst/>
-          </a:prstGeom>
-        </p:spPr>
-      </p:pic>
-      <p:sp>
-        <p:nvSpPr>
-          <p:cNvPr id="63" name="TextBox 62">
-            <a:extLst>
-              <a:ext uri="{FF2B5EF4-FFF2-40B4-BE49-F238E27FC236}">
-                <a16:creationId xmlns:a16="http://schemas.microsoft.com/office/drawing/2014/main" id="{BB45E180-E4F0-B8A0-6E1D-6AE9EFF112A3}"/>
-              </a:ext>
-            </a:extLst>
-          </p:cNvPr>
-          <p:cNvSpPr txBox="1"/>
-          <p:nvPr/>
-        </p:nvSpPr>
-        <p:spPr>
-          <a:xfrm>
-            <a:off x="16511383" y="30358544"/>
-            <a:ext cx="6678737" cy="1200329"/>
-          </a:xfrm>
-          <a:prstGeom prst="rect">
-            <a:avLst/>
-          </a:prstGeom>
-          <a:noFill/>
-        </p:spPr>
-        <p:txBody>
-          <a:bodyPr wrap="square" rtlCol="0">
-            <a:spAutoFit/>
-          </a:bodyPr>
-          <a:lstStyle/>
-          <a:p>
-            <a:r>
-              <a:rPr lang="en-US" sz="3600" dirty="0"/>
-              <a:t>I’m going to make this into a nice digital image</a:t>
+              <a:t>Prediction of z Position of Top of Valley</a:t>
             </a:r>
           </a:p>
         </p:txBody>
@@ -3720,7 +3179,7 @@
         </p:nvSpPr>
         <p:spPr>
           <a:xfrm>
-            <a:off x="25415393" y="29130500"/>
+            <a:off x="20908400" y="21879050"/>
             <a:ext cx="3044925" cy="1229584"/>
           </a:xfrm>
           <a:prstGeom prst="rect">
@@ -3867,7 +3326,7 @@
             </a:lvl9pPr>
           </a:lstStyle>
           <a:p>
-            <a:pPr fontAlgn="auto">
+            <a:pPr algn="ctr" fontAlgn="auto">
               <a:spcAft>
                 <a:spcPts val="0"/>
               </a:spcAft>
@@ -3895,8 +3354,8 @@
         </p:nvSpPr>
         <p:spPr>
           <a:xfrm>
-            <a:off x="16172637" y="32918659"/>
-            <a:ext cx="13828719" cy="523220"/>
+            <a:off x="15619421" y="27252545"/>
+            <a:ext cx="13828719" cy="584775"/>
           </a:xfrm>
           <a:prstGeom prst="rect">
             <a:avLst/>
@@ -3911,7 +3370,7 @@
           <a:p>
             <a:pPr algn="ctr"/>
             <a:r>
-              <a:rPr lang="en-US" sz="2800" dirty="0">
+              <a:rPr lang="en-US" sz="3200" dirty="0">
                 <a:solidFill>
                   <a:schemeClr val="accent1"/>
                 </a:solidFill>
@@ -3919,7 +3378,7 @@
               <a:t>Data supports revised prediction of </a:t>
             </a:r>
             <a:r>
-              <a:rPr lang="en-US" sz="2800" b="1" dirty="0">
+              <a:rPr lang="en-US" sz="3200" b="1" dirty="0">
                 <a:solidFill>
                   <a:schemeClr val="accent1"/>
                 </a:solidFill>
@@ -3944,21 +3403,825 @@
           <p:nvPr/>
         </p:nvPicPr>
         <p:blipFill>
-          <a:blip r:embed="rId13"/>
+          <a:blip r:embed="rId6"/>
           <a:stretch>
             <a:fillRect/>
           </a:stretch>
         </p:blipFill>
         <p:spPr>
           <a:xfrm>
-            <a:off x="23691494" y="30139192"/>
-            <a:ext cx="5903513" cy="2544401"/>
+            <a:off x="17767585" y="23010922"/>
+            <a:ext cx="9471878" cy="4082359"/>
           </a:xfrm>
           <a:prstGeom prst="rect">
             <a:avLst/>
           </a:prstGeom>
         </p:spPr>
       </p:pic>
+      <p:pic>
+        <p:nvPicPr>
+          <p:cNvPr id="14" name="Picture Placeholder 13" descr="A white cone shaped object with text&#10;&#10;Description automatically generated">
+            <a:extLst>
+              <a:ext uri="{FF2B5EF4-FFF2-40B4-BE49-F238E27FC236}">
+                <a16:creationId xmlns:a16="http://schemas.microsoft.com/office/drawing/2014/main" id="{22C4BB55-BC90-C450-AF61-25A08A3CC640}"/>
+              </a:ext>
+            </a:extLst>
+          </p:cNvPr>
+          <p:cNvPicPr>
+            <a:picLocks noGrp="1" noChangeAspect="1"/>
+          </p:cNvPicPr>
+          <p:nvPr>
+            <p:ph type="pic" sz="quarter" idx="22"/>
+          </p:nvPr>
+        </p:nvPicPr>
+        <p:blipFill rotWithShape="1">
+          <a:blip r:embed="rId7"/>
+          <a:srcRect t="-736" b="223"/>
+          <a:stretch/>
+        </p:blipFill>
+        <p:spPr>
+          <a:xfrm>
+            <a:off x="1985628" y="26004079"/>
+            <a:ext cx="4832507" cy="8644303"/>
+          </a:xfrm>
+        </p:spPr>
+      </p:pic>
+      <p:pic>
+        <p:nvPicPr>
+          <p:cNvPr id="16" name="Picture 15" descr="A colorful squares with numbers and lines&#10;&#10;Description automatically generated with medium confidence">
+            <a:extLst>
+              <a:ext uri="{FF2B5EF4-FFF2-40B4-BE49-F238E27FC236}">
+                <a16:creationId xmlns:a16="http://schemas.microsoft.com/office/drawing/2014/main" id="{7D06CD32-D757-DEA4-6286-084A03528BA1}"/>
+              </a:ext>
+            </a:extLst>
+          </p:cNvPr>
+          <p:cNvPicPr>
+            <a:picLocks noChangeAspect="1"/>
+          </p:cNvPicPr>
+          <p:nvPr/>
+        </p:nvPicPr>
+        <p:blipFill>
+          <a:blip r:embed="rId8"/>
+          <a:stretch>
+            <a:fillRect/>
+          </a:stretch>
+        </p:blipFill>
+        <p:spPr>
+          <a:xfrm>
+            <a:off x="7310480" y="25544485"/>
+            <a:ext cx="6346496" cy="4759872"/>
+          </a:xfrm>
+          <a:prstGeom prst="rect">
+            <a:avLst/>
+          </a:prstGeom>
+        </p:spPr>
+      </p:pic>
+      <p:pic>
+        <p:nvPicPr>
+          <p:cNvPr id="21" name="Picture 20" descr="A colorful square with numbers and lines&#10;&#10;Description automatically generated with medium confidence">
+            <a:extLst>
+              <a:ext uri="{FF2B5EF4-FFF2-40B4-BE49-F238E27FC236}">
+                <a16:creationId xmlns:a16="http://schemas.microsoft.com/office/drawing/2014/main" id="{BF9B3142-DD29-3C37-1ABB-8437DC166A60}"/>
+              </a:ext>
+            </a:extLst>
+          </p:cNvPr>
+          <p:cNvPicPr>
+            <a:picLocks noChangeAspect="1"/>
+          </p:cNvPicPr>
+          <p:nvPr/>
+        </p:nvPicPr>
+        <p:blipFill>
+          <a:blip r:embed="rId9"/>
+          <a:stretch>
+            <a:fillRect/>
+          </a:stretch>
+        </p:blipFill>
+        <p:spPr>
+          <a:xfrm>
+            <a:off x="7310481" y="30320390"/>
+            <a:ext cx="6346496" cy="4840866"/>
+          </a:xfrm>
+          <a:prstGeom prst="rect">
+            <a:avLst/>
+          </a:prstGeom>
+        </p:spPr>
+      </p:pic>
+      <p:pic>
+        <p:nvPicPr>
+          <p:cNvPr id="23" name="Picture 22" descr="A blue and yellow logo&#10;&#10;Description automatically generated">
+            <a:extLst>
+              <a:ext uri="{FF2B5EF4-FFF2-40B4-BE49-F238E27FC236}">
+                <a16:creationId xmlns:a16="http://schemas.microsoft.com/office/drawing/2014/main" id="{8DE5E406-3311-AF5B-769F-9B4513A07DFC}"/>
+              </a:ext>
+            </a:extLst>
+          </p:cNvPr>
+          <p:cNvPicPr>
+            <a:picLocks noChangeAspect="1"/>
+          </p:cNvPicPr>
+          <p:nvPr/>
+        </p:nvPicPr>
+        <p:blipFill>
+          <a:blip r:embed="rId10"/>
+          <a:stretch>
+            <a:fillRect/>
+          </a:stretch>
+        </p:blipFill>
+        <p:spPr>
+          <a:xfrm>
+            <a:off x="6232868" y="38208177"/>
+            <a:ext cx="2428511" cy="1070117"/>
+          </a:xfrm>
+          <a:prstGeom prst="rect">
+            <a:avLst/>
+          </a:prstGeom>
+        </p:spPr>
+      </p:pic>
+      <p:pic>
+        <p:nvPicPr>
+          <p:cNvPr id="52" name="Picture 51" descr="A graph of different colors and numbers&#10;&#10;Description automatically generated">
+            <a:extLst>
+              <a:ext uri="{FF2B5EF4-FFF2-40B4-BE49-F238E27FC236}">
+                <a16:creationId xmlns:a16="http://schemas.microsoft.com/office/drawing/2014/main" id="{D3289469-23EE-E68E-5C43-E989EA041273}"/>
+              </a:ext>
+            </a:extLst>
+          </p:cNvPr>
+          <p:cNvPicPr>
+            <a:picLocks noChangeAspect="1"/>
+          </p:cNvPicPr>
+          <p:nvPr/>
+        </p:nvPicPr>
+        <p:blipFill>
+          <a:blip r:embed="rId11"/>
+          <a:stretch>
+            <a:fillRect/>
+          </a:stretch>
+        </p:blipFill>
+        <p:spPr>
+          <a:xfrm>
+            <a:off x="18585696" y="9269473"/>
+            <a:ext cx="7835656" cy="5876742"/>
+          </a:xfrm>
+          <a:prstGeom prst="rect">
+            <a:avLst/>
+          </a:prstGeom>
+        </p:spPr>
+      </p:pic>
+      <p:sp>
+        <p:nvSpPr>
+          <p:cNvPr id="57" name="TextBox 56">
+            <a:extLst>
+              <a:ext uri="{FF2B5EF4-FFF2-40B4-BE49-F238E27FC236}">
+                <a16:creationId xmlns:a16="http://schemas.microsoft.com/office/drawing/2014/main" id="{949C71B4-B09E-D8D6-15EF-4FB0575E0AD0}"/>
+              </a:ext>
+            </a:extLst>
+          </p:cNvPr>
+          <p:cNvSpPr txBox="1"/>
+          <p:nvPr/>
+        </p:nvSpPr>
+        <p:spPr>
+          <a:xfrm>
+            <a:off x="15918168" y="15381281"/>
+            <a:ext cx="13170712" cy="1569660"/>
+          </a:xfrm>
+          <a:prstGeom prst="rect">
+            <a:avLst/>
+          </a:prstGeom>
+          <a:noFill/>
+        </p:spPr>
+        <p:txBody>
+          <a:bodyPr wrap="square" rtlCol="0">
+            <a:spAutoFit/>
+          </a:bodyPr>
+          <a:lstStyle/>
+          <a:p>
+            <a:r>
+              <a:rPr lang="en-US" sz="3200" b="1" dirty="0">
+                <a:solidFill>
+                  <a:schemeClr val="accent1"/>
+                </a:solidFill>
+              </a:rPr>
+              <a:t>The effect of the radius of the blackbody absorber and SNSPD mount were investigated using an unphysically large SNSPD. A minimum was not consistently observed at the focus, but a valley is seen.</a:t>
+            </a:r>
+          </a:p>
+        </p:txBody>
+      </p:sp>
+      <p:grpSp>
+        <p:nvGrpSpPr>
+          <p:cNvPr id="75" name="Group 74">
+            <a:extLst>
+              <a:ext uri="{FF2B5EF4-FFF2-40B4-BE49-F238E27FC236}">
+                <a16:creationId xmlns:a16="http://schemas.microsoft.com/office/drawing/2014/main" id="{F85E045B-87AE-D079-49A6-A0D3BA3100F6}"/>
+              </a:ext>
+            </a:extLst>
+          </p:cNvPr>
+          <p:cNvGrpSpPr/>
+          <p:nvPr/>
+        </p:nvGrpSpPr>
+        <p:grpSpPr>
+          <a:xfrm>
+            <a:off x="15935894" y="19707893"/>
+            <a:ext cx="13407455" cy="2171700"/>
+            <a:chOff x="16266795" y="19570708"/>
+            <a:chExt cx="13407455" cy="2171700"/>
+          </a:xfrm>
+        </p:grpSpPr>
+        <p:pic>
+          <p:nvPicPr>
+            <p:cNvPr id="68" name="Picture 67" descr="A green rectangle with black text&#10;&#10;Description automatically generated">
+              <a:extLst>
+                <a:ext uri="{FF2B5EF4-FFF2-40B4-BE49-F238E27FC236}">
+                  <a16:creationId xmlns:a16="http://schemas.microsoft.com/office/drawing/2014/main" id="{1A57AFF8-AF96-48FC-795B-2BF6E2F362BD}"/>
+                </a:ext>
+              </a:extLst>
+            </p:cNvPr>
+            <p:cNvPicPr>
+              <a:picLocks noChangeAspect="1"/>
+            </p:cNvPicPr>
+            <p:nvPr/>
+          </p:nvPicPr>
+          <p:blipFill>
+            <a:blip r:embed="rId12"/>
+            <a:stretch>
+              <a:fillRect/>
+            </a:stretch>
+          </p:blipFill>
+          <p:spPr>
+            <a:xfrm>
+              <a:off x="16266795" y="19570708"/>
+              <a:ext cx="7019925" cy="2171700"/>
+            </a:xfrm>
+            <a:prstGeom prst="rect">
+              <a:avLst/>
+            </a:prstGeom>
+          </p:spPr>
+        </p:pic>
+        <p:pic>
+          <p:nvPicPr>
+            <p:cNvPr id="70" name="Picture 69">
+              <a:extLst>
+                <a:ext uri="{FF2B5EF4-FFF2-40B4-BE49-F238E27FC236}">
+                  <a16:creationId xmlns:a16="http://schemas.microsoft.com/office/drawing/2014/main" id="{C53F6028-3634-96B8-817A-A13EE6458B4F}"/>
+                </a:ext>
+              </a:extLst>
+            </p:cNvPr>
+            <p:cNvPicPr>
+              <a:picLocks noChangeAspect="1"/>
+            </p:cNvPicPr>
+            <p:nvPr/>
+          </p:nvPicPr>
+          <p:blipFill>
+            <a:blip r:embed="rId13"/>
+            <a:stretch>
+              <a:fillRect/>
+            </a:stretch>
+          </p:blipFill>
+          <p:spPr>
+            <a:xfrm>
+              <a:off x="23872715" y="19602535"/>
+              <a:ext cx="5801535" cy="1991003"/>
+            </a:xfrm>
+            <a:prstGeom prst="rect">
+              <a:avLst/>
+            </a:prstGeom>
+          </p:spPr>
+        </p:pic>
+        <p:pic>
+          <p:nvPicPr>
+            <p:cNvPr id="74" name="Picture 73">
+              <a:extLst>
+                <a:ext uri="{FF2B5EF4-FFF2-40B4-BE49-F238E27FC236}">
+                  <a16:creationId xmlns:a16="http://schemas.microsoft.com/office/drawing/2014/main" id="{573906EB-E88D-AEE6-53C6-2A89670E79F3}"/>
+                </a:ext>
+              </a:extLst>
+            </p:cNvPr>
+            <p:cNvPicPr>
+              <a:picLocks noChangeAspect="1"/>
+            </p:cNvPicPr>
+            <p:nvPr/>
+          </p:nvPicPr>
+          <p:blipFill>
+            <a:blip r:embed="rId14"/>
+            <a:stretch>
+              <a:fillRect/>
+            </a:stretch>
+          </p:blipFill>
+          <p:spPr>
+            <a:xfrm>
+              <a:off x="22430864" y="20402030"/>
+              <a:ext cx="914528" cy="333422"/>
+            </a:xfrm>
+            <a:prstGeom prst="rect">
+              <a:avLst/>
+            </a:prstGeom>
+          </p:spPr>
+        </p:pic>
+      </p:grpSp>
+      <p:sp>
+        <p:nvSpPr>
+          <p:cNvPr id="77" name="Text Placeholder 8">
+            <a:extLst>
+              <a:ext uri="{FF2B5EF4-FFF2-40B4-BE49-F238E27FC236}">
+                <a16:creationId xmlns:a16="http://schemas.microsoft.com/office/drawing/2014/main" id="{41AE9610-0768-8F56-9804-68EB02CA0C30}"/>
+              </a:ext>
+            </a:extLst>
+          </p:cNvPr>
+          <p:cNvSpPr txBox="1">
+            <a:spLocks/>
+          </p:cNvSpPr>
+          <p:nvPr/>
+        </p:nvSpPr>
+        <p:spPr>
+          <a:xfrm>
+            <a:off x="15625828" y="27825519"/>
+            <a:ext cx="13761720" cy="1229584"/>
+          </a:xfrm>
+          <a:prstGeom prst="rect">
+            <a:avLst/>
+          </a:prstGeom>
+        </p:spPr>
+        <p:txBody>
+          <a:bodyPr vert="horz" anchor="ctr" anchorCtr="0"/>
+          <a:lstStyle>
+            <a:lvl1pPr marL="0" indent="0" algn="l" defTabSz="457200" rtl="0" eaLnBrk="1" latinLnBrk="0" hangingPunct="1">
+              <a:spcBef>
+                <a:spcPct val="20000"/>
+              </a:spcBef>
+              <a:buFontTx/>
+              <a:buNone/>
+              <a:defRPr sz="5000" b="1" i="0" kern="1200" baseline="0">
+                <a:solidFill>
+                  <a:srgbClr val="004C97"/>
+                </a:solidFill>
+                <a:latin typeface="Helvetica"/>
+                <a:ea typeface="+mn-ea"/>
+                <a:cs typeface="+mn-cs"/>
+              </a:defRPr>
+            </a:lvl1pPr>
+            <a:lvl2pPr marL="0" indent="0" algn="l" defTabSz="457200" rtl="0" eaLnBrk="1" latinLnBrk="0" hangingPunct="1">
+              <a:spcBef>
+                <a:spcPct val="20000"/>
+              </a:spcBef>
+              <a:buFontTx/>
+              <a:buNone/>
+              <a:defRPr sz="4000" b="0" i="0" kern="1200" baseline="0">
+                <a:solidFill>
+                  <a:schemeClr val="tx1"/>
+                </a:solidFill>
+                <a:latin typeface="Helvetica"/>
+                <a:ea typeface="+mn-ea"/>
+                <a:cs typeface="+mn-cs"/>
+              </a:defRPr>
+            </a:lvl2pPr>
+            <a:lvl3pPr marL="0" indent="0" algn="l" defTabSz="457200" rtl="0" eaLnBrk="1" latinLnBrk="0" hangingPunct="1">
+              <a:spcBef>
+                <a:spcPct val="20000"/>
+              </a:spcBef>
+              <a:buFontTx/>
+              <a:buNone/>
+              <a:defRPr sz="6000" b="1" i="0" kern="1200" baseline="0">
+                <a:solidFill>
+                  <a:srgbClr val="004C97"/>
+                </a:solidFill>
+                <a:latin typeface="Helvetica"/>
+                <a:ea typeface="+mn-ea"/>
+                <a:cs typeface="+mn-cs"/>
+              </a:defRPr>
+            </a:lvl3pPr>
+            <a:lvl4pPr marL="0" indent="0" algn="l" defTabSz="457200" rtl="0" eaLnBrk="1" latinLnBrk="0" hangingPunct="1">
+              <a:spcBef>
+                <a:spcPct val="20000"/>
+              </a:spcBef>
+              <a:buFontTx/>
+              <a:buNone/>
+              <a:defRPr sz="6000" b="1" i="0" kern="1200" baseline="0">
+                <a:solidFill>
+                  <a:srgbClr val="004C97"/>
+                </a:solidFill>
+                <a:latin typeface="Helvetica"/>
+                <a:ea typeface="+mn-ea"/>
+                <a:cs typeface="+mn-cs"/>
+              </a:defRPr>
+            </a:lvl4pPr>
+            <a:lvl5pPr marL="0" indent="0" algn="l" defTabSz="457200" rtl="0" eaLnBrk="1" latinLnBrk="0" hangingPunct="1">
+              <a:spcBef>
+                <a:spcPct val="20000"/>
+              </a:spcBef>
+              <a:buFontTx/>
+              <a:buNone/>
+              <a:defRPr sz="6000" b="1" i="0" kern="1200" baseline="0">
+                <a:solidFill>
+                  <a:srgbClr val="004C97"/>
+                </a:solidFill>
+                <a:latin typeface="Helvetica"/>
+                <a:ea typeface="+mn-ea"/>
+                <a:cs typeface="+mn-cs"/>
+              </a:defRPr>
+            </a:lvl5pPr>
+            <a:lvl6pPr marL="2514600" indent="-228600" algn="l" defTabSz="457200" rtl="0" eaLnBrk="1" latinLnBrk="0" hangingPunct="1">
+              <a:spcBef>
+                <a:spcPct val="20000"/>
+              </a:spcBef>
+              <a:buFont typeface="Arial"/>
+              <a:buChar char="•"/>
+              <a:defRPr sz="2000" kern="1200">
+                <a:solidFill>
+                  <a:schemeClr val="tx1"/>
+                </a:solidFill>
+                <a:latin typeface="+mn-lt"/>
+                <a:ea typeface="+mn-ea"/>
+                <a:cs typeface="+mn-cs"/>
+              </a:defRPr>
+            </a:lvl6pPr>
+            <a:lvl7pPr marL="2971800" indent="-228600" algn="l" defTabSz="457200" rtl="0" eaLnBrk="1" latinLnBrk="0" hangingPunct="1">
+              <a:spcBef>
+                <a:spcPct val="20000"/>
+              </a:spcBef>
+              <a:buFont typeface="Arial"/>
+              <a:buChar char="•"/>
+              <a:defRPr sz="2000" kern="1200">
+                <a:solidFill>
+                  <a:schemeClr val="tx1"/>
+                </a:solidFill>
+                <a:latin typeface="+mn-lt"/>
+                <a:ea typeface="+mn-ea"/>
+                <a:cs typeface="+mn-cs"/>
+              </a:defRPr>
+            </a:lvl7pPr>
+            <a:lvl8pPr marL="3429000" indent="-228600" algn="l" defTabSz="457200" rtl="0" eaLnBrk="1" latinLnBrk="0" hangingPunct="1">
+              <a:spcBef>
+                <a:spcPct val="20000"/>
+              </a:spcBef>
+              <a:buFont typeface="Arial"/>
+              <a:buChar char="•"/>
+              <a:defRPr sz="2000" kern="1200">
+                <a:solidFill>
+                  <a:schemeClr val="tx1"/>
+                </a:solidFill>
+                <a:latin typeface="+mn-lt"/>
+                <a:ea typeface="+mn-ea"/>
+                <a:cs typeface="+mn-cs"/>
+              </a:defRPr>
+            </a:lvl8pPr>
+            <a:lvl9pPr marL="3886200" indent="-228600" algn="l" defTabSz="457200" rtl="0" eaLnBrk="1" latinLnBrk="0" hangingPunct="1">
+              <a:spcBef>
+                <a:spcPct val="20000"/>
+              </a:spcBef>
+              <a:buFont typeface="Arial"/>
+              <a:buChar char="•"/>
+              <a:defRPr sz="2000" kern="1200">
+                <a:solidFill>
+                  <a:schemeClr val="tx1"/>
+                </a:solidFill>
+                <a:latin typeface="+mn-lt"/>
+                <a:ea typeface="+mn-ea"/>
+                <a:cs typeface="+mn-cs"/>
+              </a:defRPr>
+            </a:lvl9pPr>
+          </a:lstStyle>
+          <a:p>
+            <a:pPr algn="ctr" fontAlgn="auto">
+              <a:spcAft>
+                <a:spcPts val="0"/>
+              </a:spcAft>
+            </a:pPr>
+            <a:r>
+              <a:rPr lang="en-US" sz="5500" dirty="0">
+                <a:latin typeface="+mj-lt"/>
+              </a:rPr>
+              <a:t>Realistic Scale Simulations</a:t>
+            </a:r>
+          </a:p>
+        </p:txBody>
+      </p:sp>
+      <p:pic>
+        <p:nvPicPr>
+          <p:cNvPr id="79" name="Picture 78" descr="A graph with blue dots&#10;&#10;Description automatically generated">
+            <a:extLst>
+              <a:ext uri="{FF2B5EF4-FFF2-40B4-BE49-F238E27FC236}">
+                <a16:creationId xmlns:a16="http://schemas.microsoft.com/office/drawing/2014/main" id="{3325D723-B23D-81A0-4024-1B1CA0B9A17C}"/>
+              </a:ext>
+            </a:extLst>
+          </p:cNvPr>
+          <p:cNvPicPr>
+            <a:picLocks noChangeAspect="1"/>
+          </p:cNvPicPr>
+          <p:nvPr/>
+        </p:nvPicPr>
+        <p:blipFill>
+          <a:blip r:embed="rId15"/>
+          <a:stretch>
+            <a:fillRect/>
+          </a:stretch>
+        </p:blipFill>
+        <p:spPr>
+          <a:xfrm>
+            <a:off x="15390780" y="29055103"/>
+            <a:ext cx="7010400" cy="5257800"/>
+          </a:xfrm>
+          <a:prstGeom prst="rect">
+            <a:avLst/>
+          </a:prstGeom>
+        </p:spPr>
+      </p:pic>
+      <p:pic>
+        <p:nvPicPr>
+          <p:cNvPr id="81" name="Picture 80" descr="A graph with blue dots and black text&#10;&#10;Description automatically generated">
+            <a:extLst>
+              <a:ext uri="{FF2B5EF4-FFF2-40B4-BE49-F238E27FC236}">
+                <a16:creationId xmlns:a16="http://schemas.microsoft.com/office/drawing/2014/main" id="{F2678933-904D-863D-DBF0-7CE18B74F715}"/>
+              </a:ext>
+            </a:extLst>
+          </p:cNvPr>
+          <p:cNvPicPr>
+            <a:picLocks noChangeAspect="1"/>
+          </p:cNvPicPr>
+          <p:nvPr/>
+        </p:nvPicPr>
+        <p:blipFill>
+          <a:blip r:embed="rId16"/>
+          <a:stretch>
+            <a:fillRect/>
+          </a:stretch>
+        </p:blipFill>
+        <p:spPr>
+          <a:xfrm>
+            <a:off x="22275827" y="29074948"/>
+            <a:ext cx="7010400" cy="5257800"/>
+          </a:xfrm>
+          <a:prstGeom prst="rect">
+            <a:avLst/>
+          </a:prstGeom>
+        </p:spPr>
+      </p:pic>
+      <p:sp>
+        <p:nvSpPr>
+          <p:cNvPr id="84" name="TextBox 83">
+            <a:extLst>
+              <a:ext uri="{FF2B5EF4-FFF2-40B4-BE49-F238E27FC236}">
+                <a16:creationId xmlns:a16="http://schemas.microsoft.com/office/drawing/2014/main" id="{44F34D09-1890-35B2-3524-5D70253D05A6}"/>
+              </a:ext>
+            </a:extLst>
+          </p:cNvPr>
+          <p:cNvSpPr txBox="1"/>
+          <p:nvPr/>
+        </p:nvSpPr>
+        <p:spPr>
+          <a:xfrm>
+            <a:off x="15642867" y="34471618"/>
+            <a:ext cx="13828719" cy="584775"/>
+          </a:xfrm>
+          <a:prstGeom prst="rect">
+            <a:avLst/>
+          </a:prstGeom>
+          <a:noFill/>
+        </p:spPr>
+        <p:txBody>
+          <a:bodyPr wrap="square" rtlCol="0">
+            <a:spAutoFit/>
+          </a:bodyPr>
+          <a:lstStyle/>
+          <a:p>
+            <a:pPr algn="ctr"/>
+            <a:r>
+              <a:rPr lang="en-US" sz="3200" dirty="0">
+                <a:solidFill>
+                  <a:schemeClr val="accent1"/>
+                </a:solidFill>
+              </a:rPr>
+              <a:t>Throw the old model out; calibration expectation confirmed to within 50 microns!</a:t>
+            </a:r>
+            <a:endParaRPr lang="en-US" sz="3200" b="1" dirty="0">
+              <a:solidFill>
+                <a:schemeClr val="accent1"/>
+              </a:solidFill>
+            </a:endParaRPr>
+          </a:p>
+        </p:txBody>
+      </p:sp>
+      <p:sp>
+        <p:nvSpPr>
+          <p:cNvPr id="87" name="TextBox 86">
+            <a:extLst>
+              <a:ext uri="{FF2B5EF4-FFF2-40B4-BE49-F238E27FC236}">
+                <a16:creationId xmlns:a16="http://schemas.microsoft.com/office/drawing/2014/main" id="{5144A636-7617-B98D-7E97-1D70E9D87305}"/>
+              </a:ext>
+            </a:extLst>
+          </p:cNvPr>
+          <p:cNvSpPr txBox="1"/>
+          <p:nvPr/>
+        </p:nvSpPr>
+        <p:spPr>
+          <a:xfrm>
+            <a:off x="15905013" y="35893068"/>
+            <a:ext cx="13179901" cy="1815882"/>
+          </a:xfrm>
+          <a:prstGeom prst="rect">
+            <a:avLst/>
+          </a:prstGeom>
+          <a:noFill/>
+        </p:spPr>
+        <p:txBody>
+          <a:bodyPr wrap="square" rtlCol="0">
+            <a:spAutoFit/>
+          </a:bodyPr>
+          <a:lstStyle/>
+          <a:p>
+            <a:r>
+              <a:rPr lang="en-US" sz="1600" dirty="0">
+                <a:latin typeface="+mj-lt"/>
+              </a:rPr>
+              <a:t>[1] </a:t>
+            </a:r>
+            <a:r>
+              <a:rPr lang="en-US" sz="1600" dirty="0">
+                <a:effectLst/>
+                <a:latin typeface="+mj-lt"/>
+              </a:rPr>
+              <a:t>R. D. Peccei and H. R. Quinn, “CP conservation in the presence of </a:t>
+            </a:r>
+            <a:r>
+              <a:rPr lang="en-US" sz="1600" dirty="0" err="1">
+                <a:effectLst/>
+                <a:latin typeface="+mj-lt"/>
+              </a:rPr>
+              <a:t>pseudoparticles</a:t>
+            </a:r>
+            <a:r>
+              <a:rPr lang="en-US" sz="1600" dirty="0">
+                <a:effectLst/>
+                <a:latin typeface="+mj-lt"/>
+              </a:rPr>
+              <a:t>,” Phys. Rev. Lett. 38, 1440–1443 (1977).</a:t>
+            </a:r>
+          </a:p>
+          <a:p>
+            <a:r>
+              <a:rPr lang="en-US" sz="1600" dirty="0">
+                <a:latin typeface="+mj-lt"/>
+              </a:rPr>
+              <a:t>[2] </a:t>
+            </a:r>
+            <a:r>
+              <a:rPr lang="en-US" sz="1600" dirty="0">
+                <a:effectLst/>
+                <a:latin typeface="+mj-lt"/>
+              </a:rPr>
+              <a:t>R. D. Peccei and H. R. Quinn, “Constraints imposed by CP conservation in the presence of </a:t>
+            </a:r>
+            <a:r>
+              <a:rPr lang="en-US" sz="1600" dirty="0" err="1">
+                <a:effectLst/>
+                <a:latin typeface="+mj-lt"/>
+              </a:rPr>
+              <a:t>pseudoparticles</a:t>
+            </a:r>
+            <a:r>
+              <a:rPr lang="en-US" sz="1600" dirty="0">
+                <a:effectLst/>
+                <a:latin typeface="+mj-lt"/>
+              </a:rPr>
+              <a:t>,” Phys. Rev. D 16, 1791–1797 (1977).</a:t>
+            </a:r>
+            <a:endParaRPr lang="en-US" sz="1600" dirty="0">
+              <a:latin typeface="+mj-lt"/>
+            </a:endParaRPr>
+          </a:p>
+          <a:p>
+            <a:r>
+              <a:rPr lang="en-US" sz="1600" dirty="0">
+                <a:latin typeface="+mj-lt"/>
+              </a:rPr>
+              <a:t>[3]</a:t>
+            </a:r>
+            <a:r>
+              <a:rPr lang="en-US" sz="1600" dirty="0">
+                <a:effectLst/>
+                <a:latin typeface="+mj-lt"/>
+              </a:rPr>
+              <a:t> S. Weinberg, “A new light boson?” Phys. Rev. Lett. 40, 223–226 (1978).</a:t>
+            </a:r>
+          </a:p>
+          <a:p>
+            <a:r>
+              <a:rPr lang="en-US" sz="1600" dirty="0">
+                <a:latin typeface="+mj-lt"/>
+              </a:rPr>
+              <a:t>[4] </a:t>
+            </a:r>
+            <a:r>
+              <a:rPr lang="en-US" sz="1600" dirty="0">
+                <a:effectLst/>
+                <a:latin typeface="+mj-lt"/>
+              </a:rPr>
+              <a:t>F. </a:t>
+            </a:r>
+            <a:r>
+              <a:rPr lang="en-US" sz="1600" dirty="0" err="1">
+                <a:effectLst/>
+                <a:latin typeface="+mj-lt"/>
+              </a:rPr>
+              <a:t>Wilczek</a:t>
+            </a:r>
+            <a:r>
+              <a:rPr lang="en-US" sz="1600" dirty="0">
+                <a:effectLst/>
+                <a:latin typeface="+mj-lt"/>
+              </a:rPr>
+              <a:t>, “Problem of Strong P and T Invariance in the Presence of Instantons,” Phys. Rev. Lett. 40, 279–282 (1978).</a:t>
+            </a:r>
+          </a:p>
+          <a:p>
+            <a:r>
+              <a:rPr lang="en-US" sz="1600" dirty="0">
+                <a:latin typeface="+mj-lt"/>
+              </a:rPr>
+              <a:t>[5] </a:t>
+            </a:r>
+            <a:r>
+              <a:rPr lang="en-US" sz="1600" dirty="0">
+                <a:effectLst/>
+                <a:latin typeface="+mj-lt"/>
+              </a:rPr>
+              <a:t>M. Dine, W. </a:t>
+            </a:r>
+            <a:r>
+              <a:rPr lang="en-US" sz="1600" dirty="0" err="1">
+                <a:effectLst/>
+                <a:latin typeface="+mj-lt"/>
+              </a:rPr>
+              <a:t>Fischler</a:t>
+            </a:r>
+            <a:r>
+              <a:rPr lang="en-US" sz="1600" dirty="0">
+                <a:effectLst/>
+                <a:latin typeface="+mj-lt"/>
+              </a:rPr>
+              <a:t>, and M. </a:t>
+            </a:r>
+            <a:r>
+              <a:rPr lang="en-US" sz="1600" dirty="0" err="1">
+                <a:effectLst/>
+                <a:latin typeface="+mj-lt"/>
+              </a:rPr>
+              <a:t>Srednicki</a:t>
+            </a:r>
+            <a:r>
+              <a:rPr lang="en-US" sz="1600" dirty="0">
+                <a:effectLst/>
+                <a:latin typeface="+mj-lt"/>
+              </a:rPr>
+              <a:t>, “A simple solution to the strong CP problem with a harmless axion,” Physics Letters B 104, 199–202 (1981).</a:t>
+            </a:r>
+            <a:endParaRPr lang="en-US" sz="1600" dirty="0">
+              <a:latin typeface="+mj-lt"/>
+            </a:endParaRPr>
+          </a:p>
+          <a:p>
+            <a:r>
+              <a:rPr lang="en-US" sz="1600" dirty="0">
+                <a:latin typeface="+mj-lt"/>
+              </a:rPr>
+              <a:t>[6] S. </a:t>
+            </a:r>
+            <a:r>
+              <a:rPr lang="en-US" sz="1600" dirty="0" err="1">
+                <a:latin typeface="+mj-lt"/>
+              </a:rPr>
+              <a:t>Knirck</a:t>
+            </a:r>
+            <a:r>
+              <a:rPr lang="en-US" sz="1600" dirty="0">
+                <a:latin typeface="+mj-lt"/>
+              </a:rPr>
+              <a:t>, et.al. (BREAD Collaboration)</a:t>
+            </a:r>
+            <a:r>
+              <a:rPr lang="en-US" sz="1600" dirty="0">
+                <a:effectLst/>
+                <a:latin typeface="+mj-lt"/>
+              </a:rPr>
+              <a:t>, “First results from a broadband search for dark photon dark matter in the 44 to 52 </a:t>
+            </a:r>
+            <a:r>
+              <a:rPr lang="en-US" sz="1600" dirty="0" err="1">
+                <a:effectLst/>
+                <a:latin typeface="+mj-lt"/>
+              </a:rPr>
+              <a:t>μeV</a:t>
+            </a:r>
+            <a:r>
+              <a:rPr lang="en-US" sz="1600" dirty="0">
+                <a:effectLst/>
+                <a:latin typeface="+mj-lt"/>
+              </a:rPr>
+              <a:t> range with a coaxial dish antenna,” Phys. Rev. Lett. 132, 131004 (2024).</a:t>
+            </a:r>
+            <a:endParaRPr lang="en-US" sz="1600" dirty="0">
+              <a:latin typeface="+mj-lt"/>
+            </a:endParaRPr>
+          </a:p>
+        </p:txBody>
+      </p:sp>
     </p:spTree>
     <p:extLst>
       <p:ext uri="{BB962C8B-B14F-4D97-AF65-F5344CB8AC3E}">

</xml_diff>

<commit_message>
Adding FRED script + other minor changes
</commit_message>
<xml_diff>
--- a/suli-poster.pptx
+++ b/suli-poster.pptx
@@ -217,27 +217,6 @@
 <p188:authorLst xmlns:a="http://schemas.openxmlformats.org/drawingml/2006/main" xmlns:r="http://schemas.openxmlformats.org/officeDocument/2006/relationships" xmlns:p188="http://schemas.microsoft.com/office/powerpoint/2018/8/main">
   <p188:author id="{AD2D006A-A5FE-D279-890A-FC0BC62003E3}" name="Shardul G Rao" initials="SR" userId="S::rao00091@umn.edu::d85bd64a-3b1e-46b5-bb0b-35b3129decf0" providerId="AD"/>
 </p188:authorLst>
-</file>
-
-<file path=ppt/comments/modernComment_107_F5D28FE9.xml><?xml version="1.0" encoding="utf-8"?>
-<p188:cmLst xmlns:a="http://schemas.openxmlformats.org/drawingml/2006/main" xmlns:r="http://schemas.openxmlformats.org/officeDocument/2006/relationships" xmlns:p188="http://schemas.microsoft.com/office/powerpoint/2018/8/main">
-  <p188:cm id="{27A3DE6F-7CBB-47C0-9C4E-67EAE57A45CF}" authorId="{AD2D006A-A5FE-D279-890A-FC0BC62003E3}" created="2024-07-19T19:36:53.491">
-    <pc:sldMkLst xmlns:pc="http://schemas.microsoft.com/office/powerpoint/2013/main/command">
-      <pc:docMk/>
-      <pc:sldMk cId="4124217321" sldId="263"/>
-    </pc:sldMkLst>
-    <p188:txBody>
-      <a:bodyPr/>
-      <a:lstStyle/>
-      <a:p>
-        <a:r>
-          <a:rPr lang="en-US"/>
-          <a:t>This picture will have to be changed</a:t>
-        </a:r>
-      </a:p>
-    </p188:txBody>
-  </p188:cm>
-</p188:cmLst>
 </file>
 
 <file path=ppt/slideLayouts/slideLayout1.xml><?xml version="1.0" encoding="utf-8"?>
@@ -1796,7 +1775,7 @@
           </p:nvPr>
         </p:nvPicPr>
         <p:blipFill>
-          <a:blip r:embed="rId3">
+          <a:blip r:embed="rId2">
             <a:extLst>
               <a:ext uri="{28A0092B-C50C-407E-A947-70E740481C1C}">
                 <a14:useLocalDpi xmlns:a14="http://schemas.microsoft.com/office/drawing/2010/main" val="0"/>
@@ -2496,7 +2475,7 @@
           </p:nvPr>
         </p:nvPicPr>
         <p:blipFill rotWithShape="1">
-          <a:blip r:embed="rId4"/>
+          <a:blip r:embed="rId3"/>
           <a:srcRect t="17" b="688"/>
           <a:stretch/>
         </p:blipFill>
@@ -2561,7 +2540,7 @@
           <p:nvPr/>
         </p:nvPicPr>
         <p:blipFill>
-          <a:blip r:embed="rId5"/>
+          <a:blip r:embed="rId4"/>
           <a:stretch>
             <a:fillRect/>
           </a:stretch>
@@ -3403,14 +3382,14 @@
           <p:nvPr/>
         </p:nvPicPr>
         <p:blipFill>
-          <a:blip r:embed="rId6"/>
+          <a:blip r:embed="rId5"/>
           <a:stretch>
             <a:fillRect/>
           </a:stretch>
         </p:blipFill>
         <p:spPr>
           <a:xfrm>
-            <a:off x="17767585" y="23010922"/>
+            <a:off x="17694923" y="22975101"/>
             <a:ext cx="9471878" cy="4082359"/>
           </a:xfrm>
           <a:prstGeom prst="rect">
@@ -3435,7 +3414,7 @@
           </p:nvPr>
         </p:nvPicPr>
         <p:blipFill rotWithShape="1">
-          <a:blip r:embed="rId7"/>
+          <a:blip r:embed="rId6"/>
           <a:srcRect t="-736" b="223"/>
           <a:stretch/>
         </p:blipFill>
@@ -3461,7 +3440,7 @@
           <p:nvPr/>
         </p:nvPicPr>
         <p:blipFill>
-          <a:blip r:embed="rId8"/>
+          <a:blip r:embed="rId7"/>
           <a:stretch>
             <a:fillRect/>
           </a:stretch>
@@ -3491,7 +3470,7 @@
           <p:nvPr/>
         </p:nvPicPr>
         <p:blipFill>
-          <a:blip r:embed="rId9"/>
+          <a:blip r:embed="rId8"/>
           <a:stretch>
             <a:fillRect/>
           </a:stretch>
@@ -3521,7 +3500,7 @@
           <p:nvPr/>
         </p:nvPicPr>
         <p:blipFill>
-          <a:blip r:embed="rId10"/>
+          <a:blip r:embed="rId9"/>
           <a:stretch>
             <a:fillRect/>
           </a:stretch>
@@ -3551,7 +3530,7 @@
           <p:nvPr/>
         </p:nvPicPr>
         <p:blipFill>
-          <a:blip r:embed="rId11"/>
+          <a:blip r:embed="rId10"/>
           <a:stretch>
             <a:fillRect/>
           </a:stretch>
@@ -3605,117 +3584,6 @@
           </a:p>
         </p:txBody>
       </p:sp>
-      <p:grpSp>
-        <p:nvGrpSpPr>
-          <p:cNvPr id="75" name="Group 74">
-            <a:extLst>
-              <a:ext uri="{FF2B5EF4-FFF2-40B4-BE49-F238E27FC236}">
-                <a16:creationId xmlns:a16="http://schemas.microsoft.com/office/drawing/2014/main" id="{F85E045B-87AE-D079-49A6-A0D3BA3100F6}"/>
-              </a:ext>
-            </a:extLst>
-          </p:cNvPr>
-          <p:cNvGrpSpPr/>
-          <p:nvPr/>
-        </p:nvGrpSpPr>
-        <p:grpSpPr>
-          <a:xfrm>
-            <a:off x="15935894" y="19707893"/>
-            <a:ext cx="13407455" cy="2171700"/>
-            <a:chOff x="16266795" y="19570708"/>
-            <a:chExt cx="13407455" cy="2171700"/>
-          </a:xfrm>
-        </p:grpSpPr>
-        <p:pic>
-          <p:nvPicPr>
-            <p:cNvPr id="68" name="Picture 67" descr="A green rectangle with black text&#10;&#10;Description automatically generated">
-              <a:extLst>
-                <a:ext uri="{FF2B5EF4-FFF2-40B4-BE49-F238E27FC236}">
-                  <a16:creationId xmlns:a16="http://schemas.microsoft.com/office/drawing/2014/main" id="{1A57AFF8-AF96-48FC-795B-2BF6E2F362BD}"/>
-                </a:ext>
-              </a:extLst>
-            </p:cNvPr>
-            <p:cNvPicPr>
-              <a:picLocks noChangeAspect="1"/>
-            </p:cNvPicPr>
-            <p:nvPr/>
-          </p:nvPicPr>
-          <p:blipFill>
-            <a:blip r:embed="rId12"/>
-            <a:stretch>
-              <a:fillRect/>
-            </a:stretch>
-          </p:blipFill>
-          <p:spPr>
-            <a:xfrm>
-              <a:off x="16266795" y="19570708"/>
-              <a:ext cx="7019925" cy="2171700"/>
-            </a:xfrm>
-            <a:prstGeom prst="rect">
-              <a:avLst/>
-            </a:prstGeom>
-          </p:spPr>
-        </p:pic>
-        <p:pic>
-          <p:nvPicPr>
-            <p:cNvPr id="70" name="Picture 69">
-              <a:extLst>
-                <a:ext uri="{FF2B5EF4-FFF2-40B4-BE49-F238E27FC236}">
-                  <a16:creationId xmlns:a16="http://schemas.microsoft.com/office/drawing/2014/main" id="{C53F6028-3634-96B8-817A-A13EE6458B4F}"/>
-                </a:ext>
-              </a:extLst>
-            </p:cNvPr>
-            <p:cNvPicPr>
-              <a:picLocks noChangeAspect="1"/>
-            </p:cNvPicPr>
-            <p:nvPr/>
-          </p:nvPicPr>
-          <p:blipFill>
-            <a:blip r:embed="rId13"/>
-            <a:stretch>
-              <a:fillRect/>
-            </a:stretch>
-          </p:blipFill>
-          <p:spPr>
-            <a:xfrm>
-              <a:off x="23872715" y="19602535"/>
-              <a:ext cx="5801535" cy="1991003"/>
-            </a:xfrm>
-            <a:prstGeom prst="rect">
-              <a:avLst/>
-            </a:prstGeom>
-          </p:spPr>
-        </p:pic>
-        <p:pic>
-          <p:nvPicPr>
-            <p:cNvPr id="74" name="Picture 73">
-              <a:extLst>
-                <a:ext uri="{FF2B5EF4-FFF2-40B4-BE49-F238E27FC236}">
-                  <a16:creationId xmlns:a16="http://schemas.microsoft.com/office/drawing/2014/main" id="{573906EB-E88D-AEE6-53C6-2A89670E79F3}"/>
-                </a:ext>
-              </a:extLst>
-            </p:cNvPr>
-            <p:cNvPicPr>
-              <a:picLocks noChangeAspect="1"/>
-            </p:cNvPicPr>
-            <p:nvPr/>
-          </p:nvPicPr>
-          <p:blipFill>
-            <a:blip r:embed="rId14"/>
-            <a:stretch>
-              <a:fillRect/>
-            </a:stretch>
-          </p:blipFill>
-          <p:spPr>
-            <a:xfrm>
-              <a:off x="22430864" y="20402030"/>
-              <a:ext cx="914528" cy="333422"/>
-            </a:xfrm>
-            <a:prstGeom prst="rect">
-              <a:avLst/>
-            </a:prstGeom>
-          </p:spPr>
-        </p:pic>
-      </p:grpSp>
       <p:sp>
         <p:nvSpPr>
           <p:cNvPr id="77" name="Text Placeholder 8">
@@ -3908,7 +3776,7 @@
           <p:nvPr/>
         </p:nvPicPr>
         <p:blipFill>
-          <a:blip r:embed="rId15"/>
+          <a:blip r:embed="rId11"/>
           <a:stretch>
             <a:fillRect/>
           </a:stretch>
@@ -3938,7 +3806,7 @@
           <p:nvPr/>
         </p:nvPicPr>
         <p:blipFill>
-          <a:blip r:embed="rId16"/>
+          <a:blip r:embed="rId12"/>
           <a:stretch>
             <a:fillRect/>
           </a:stretch>
@@ -4222,6 +4090,138 @@
           </a:p>
         </p:txBody>
       </p:sp>
+      <p:grpSp>
+        <p:nvGrpSpPr>
+          <p:cNvPr id="5" name="Group 4">
+            <a:extLst>
+              <a:ext uri="{FF2B5EF4-FFF2-40B4-BE49-F238E27FC236}">
+                <a16:creationId xmlns:a16="http://schemas.microsoft.com/office/drawing/2014/main" id="{940D2BE3-38A2-1153-5C9D-5D55137AF358}"/>
+              </a:ext>
+            </a:extLst>
+          </p:cNvPr>
+          <p:cNvGrpSpPr/>
+          <p:nvPr/>
+        </p:nvGrpSpPr>
+        <p:grpSpPr>
+          <a:xfrm>
+            <a:off x="16040917" y="19707893"/>
+            <a:ext cx="12579840" cy="2171700"/>
+            <a:chOff x="15935894" y="19707893"/>
+            <a:chExt cx="12579840" cy="2171700"/>
+          </a:xfrm>
+        </p:grpSpPr>
+        <p:grpSp>
+          <p:nvGrpSpPr>
+            <p:cNvPr id="75" name="Group 74">
+              <a:extLst>
+                <a:ext uri="{FF2B5EF4-FFF2-40B4-BE49-F238E27FC236}">
+                  <a16:creationId xmlns:a16="http://schemas.microsoft.com/office/drawing/2014/main" id="{F85E045B-87AE-D079-49A6-A0D3BA3100F6}"/>
+                </a:ext>
+              </a:extLst>
+            </p:cNvPr>
+            <p:cNvGrpSpPr/>
+            <p:nvPr/>
+          </p:nvGrpSpPr>
+          <p:grpSpPr>
+            <a:xfrm>
+              <a:off x="15935894" y="19707893"/>
+              <a:ext cx="7078597" cy="2171700"/>
+              <a:chOff x="16266795" y="19570708"/>
+              <a:chExt cx="7078597" cy="2171700"/>
+            </a:xfrm>
+          </p:grpSpPr>
+          <p:pic>
+            <p:nvPicPr>
+              <p:cNvPr id="68" name="Picture 67" descr="A green rectangle with black text&#10;&#10;Description automatically generated">
+                <a:extLst>
+                  <a:ext uri="{FF2B5EF4-FFF2-40B4-BE49-F238E27FC236}">
+                    <a16:creationId xmlns:a16="http://schemas.microsoft.com/office/drawing/2014/main" id="{1A57AFF8-AF96-48FC-795B-2BF6E2F362BD}"/>
+                  </a:ext>
+                </a:extLst>
+              </p:cNvPr>
+              <p:cNvPicPr>
+                <a:picLocks noChangeAspect="1"/>
+              </p:cNvPicPr>
+              <p:nvPr/>
+            </p:nvPicPr>
+            <p:blipFill>
+              <a:blip r:embed="rId13"/>
+              <a:stretch>
+                <a:fillRect/>
+              </a:stretch>
+            </p:blipFill>
+            <p:spPr>
+              <a:xfrm>
+                <a:off x="16266795" y="19570708"/>
+                <a:ext cx="7019925" cy="2171700"/>
+              </a:xfrm>
+              <a:prstGeom prst="rect">
+                <a:avLst/>
+              </a:prstGeom>
+            </p:spPr>
+          </p:pic>
+          <p:pic>
+            <p:nvPicPr>
+              <p:cNvPr id="74" name="Picture 73">
+                <a:extLst>
+                  <a:ext uri="{FF2B5EF4-FFF2-40B4-BE49-F238E27FC236}">
+                    <a16:creationId xmlns:a16="http://schemas.microsoft.com/office/drawing/2014/main" id="{573906EB-E88D-AEE6-53C6-2A89670E79F3}"/>
+                  </a:ext>
+                </a:extLst>
+              </p:cNvPr>
+              <p:cNvPicPr>
+                <a:picLocks noChangeAspect="1"/>
+              </p:cNvPicPr>
+              <p:nvPr/>
+            </p:nvPicPr>
+            <p:blipFill>
+              <a:blip r:embed="rId14"/>
+              <a:stretch>
+                <a:fillRect/>
+              </a:stretch>
+            </p:blipFill>
+            <p:spPr>
+              <a:xfrm>
+                <a:off x="22430864" y="20402030"/>
+                <a:ext cx="914528" cy="333422"/>
+              </a:xfrm>
+              <a:prstGeom prst="rect">
+                <a:avLst/>
+              </a:prstGeom>
+            </p:spPr>
+          </p:pic>
+        </p:grpSp>
+        <p:pic>
+          <p:nvPicPr>
+            <p:cNvPr id="4" name="Picture 3">
+              <a:extLst>
+                <a:ext uri="{FF2B5EF4-FFF2-40B4-BE49-F238E27FC236}">
+                  <a16:creationId xmlns:a16="http://schemas.microsoft.com/office/drawing/2014/main" id="{4E9E1AB0-62C4-EA4F-564B-522246B1CDB8}"/>
+                </a:ext>
+              </a:extLst>
+            </p:cNvPr>
+            <p:cNvPicPr>
+              <a:picLocks noChangeAspect="1"/>
+            </p:cNvPicPr>
+            <p:nvPr/>
+          </p:nvPicPr>
+          <p:blipFill>
+            <a:blip r:embed="rId15"/>
+            <a:stretch>
+              <a:fillRect/>
+            </a:stretch>
+          </p:blipFill>
+          <p:spPr>
+            <a:xfrm>
+              <a:off x="23298963" y="19774968"/>
+              <a:ext cx="5216771" cy="1861916"/>
+            </a:xfrm>
+            <a:prstGeom prst="rect">
+              <a:avLst/>
+            </a:prstGeom>
+          </p:spPr>
+        </p:pic>
+      </p:grpSp>
     </p:spTree>
     <p:extLst>
       <p:ext uri="{BB962C8B-B14F-4D97-AF65-F5344CB8AC3E}">
@@ -4232,11 +4232,6 @@
   <p:clrMapOvr>
     <a:masterClrMapping/>
   </p:clrMapOvr>
-  <p:extLst>
-    <p:ext uri="{6950BFC3-D8DA-4A85-94F7-54DA5524770B}">
-      <p188:commentRel xmlns:p188="http://schemas.microsoft.com/office/powerpoint/2018/8/main" r:id="rId2"/>
-    </p:ext>
-  </p:extLst>
 </p:sld>
 </file>
 

</xml_diff>